<commit_message>
Update 0228 발표용 project03 - 화면 설계서 - 서희.pptx
</commit_message>
<xml_diff>
--- a/project03 화면설계서/0228 발표용 project03 - 화면 설계서 - 서희.pptx
+++ b/project03 화면설계서/0228 발표용 project03 - 화면 설계서 - 서희.pptx
@@ -5,14 +5,15 @@
     <p:sldMasterId id="2147483648" r:id="rId1"/>
   </p:sldMasterIdLst>
   <p:notesMasterIdLst>
-    <p:notesMasterId r:id="rId7"/>
+    <p:notesMasterId r:id="rId8"/>
   </p:notesMasterIdLst>
   <p:sldIdLst>
     <p:sldId id="256" r:id="rId2"/>
     <p:sldId id="259" r:id="rId3"/>
     <p:sldId id="260" r:id="rId4"/>
-    <p:sldId id="257" r:id="rId5"/>
-    <p:sldId id="258" r:id="rId6"/>
+    <p:sldId id="261" r:id="rId5"/>
+    <p:sldId id="257" r:id="rId6"/>
+    <p:sldId id="258" r:id="rId7"/>
   </p:sldIdLst>
   <p:sldSz cx="12192000" cy="6858000"/>
   <p:notesSz cx="6858000" cy="9144000"/>
@@ -3727,14 +3728,14 @@
                 <a:gridCol w="1443550">
                   <a:extLst>
                     <a:ext uri="{9D8B030D-6E8A-4147-A177-3AD203B41FA5}">
-                      <a16:colId xmlns:a16="http://schemas.microsoft.com/office/drawing/2014/main" xmlns="" val="20000"/>
+                      <a16:colId xmlns="" xmlns:a16="http://schemas.microsoft.com/office/drawing/2014/main" val="20000"/>
                     </a:ext>
                   </a:extLst>
                 </a:gridCol>
                 <a:gridCol w="2680550">
                   <a:extLst>
                     <a:ext uri="{9D8B030D-6E8A-4147-A177-3AD203B41FA5}">
-                      <a16:colId xmlns:a16="http://schemas.microsoft.com/office/drawing/2014/main" xmlns="" val="20001"/>
+                      <a16:colId xmlns="" xmlns:a16="http://schemas.microsoft.com/office/drawing/2014/main" val="20001"/>
                     </a:ext>
                   </a:extLst>
                 </a:gridCol>
@@ -3900,7 +3901,7 @@
                 </a:tc>
                 <a:extLst>
                   <a:ext uri="{0D108BD9-81ED-4DB2-BD59-A6C34878D82A}">
-                    <a16:rowId xmlns:a16="http://schemas.microsoft.com/office/drawing/2014/main" xmlns="" val="10000"/>
+                    <a16:rowId xmlns="" xmlns:a16="http://schemas.microsoft.com/office/drawing/2014/main" val="10000"/>
                   </a:ext>
                 </a:extLst>
               </a:tr>
@@ -4081,7 +4082,7 @@
                 </a:tc>
                 <a:extLst>
                   <a:ext uri="{0D108BD9-81ED-4DB2-BD59-A6C34878D82A}">
-                    <a16:rowId xmlns:a16="http://schemas.microsoft.com/office/drawing/2014/main" xmlns="" val="10001"/>
+                    <a16:rowId xmlns="" xmlns:a16="http://schemas.microsoft.com/office/drawing/2014/main" val="10001"/>
                   </a:ext>
                 </a:extLst>
               </a:tr>
@@ -4177,7 +4178,7 @@
                 </a:tc>
                 <a:extLst>
                   <a:ext uri="{0D108BD9-81ED-4DB2-BD59-A6C34878D82A}">
-                    <a16:rowId xmlns:a16="http://schemas.microsoft.com/office/drawing/2014/main" xmlns="" val="10002"/>
+                    <a16:rowId xmlns="" xmlns:a16="http://schemas.microsoft.com/office/drawing/2014/main" val="10002"/>
                   </a:ext>
                 </a:extLst>
               </a:tr>
@@ -4205,14 +4206,14 @@
                 <a:gridCol w="1407750">
                   <a:extLst>
                     <a:ext uri="{9D8B030D-6E8A-4147-A177-3AD203B41FA5}">
-                      <a16:colId xmlns:a16="http://schemas.microsoft.com/office/drawing/2014/main" xmlns="" val="20000"/>
+                      <a16:colId xmlns="" xmlns:a16="http://schemas.microsoft.com/office/drawing/2014/main" val="20000"/>
                     </a:ext>
                   </a:extLst>
                 </a:gridCol>
                 <a:gridCol w="1407750">
                   <a:extLst>
                     <a:ext uri="{9D8B030D-6E8A-4147-A177-3AD203B41FA5}">
-                      <a16:colId xmlns:a16="http://schemas.microsoft.com/office/drawing/2014/main" xmlns="" val="20001"/>
+                      <a16:colId xmlns="" xmlns:a16="http://schemas.microsoft.com/office/drawing/2014/main" val="20001"/>
                     </a:ext>
                   </a:extLst>
                 </a:gridCol>
@@ -4370,7 +4371,7 @@
                 </a:tc>
                 <a:extLst>
                   <a:ext uri="{0D108BD9-81ED-4DB2-BD59-A6C34878D82A}">
-                    <a16:rowId xmlns:a16="http://schemas.microsoft.com/office/drawing/2014/main" xmlns="" val="10000"/>
+                    <a16:rowId xmlns="" xmlns:a16="http://schemas.microsoft.com/office/drawing/2014/main" val="10000"/>
                   </a:ext>
                 </a:extLst>
               </a:tr>
@@ -4398,14 +4399,14 @@
                 <a:gridCol w="1407750">
                   <a:extLst>
                     <a:ext uri="{9D8B030D-6E8A-4147-A177-3AD203B41FA5}">
-                      <a16:colId xmlns:a16="http://schemas.microsoft.com/office/drawing/2014/main" xmlns="" val="20000"/>
+                      <a16:colId xmlns="" xmlns:a16="http://schemas.microsoft.com/office/drawing/2014/main" val="20000"/>
                     </a:ext>
                   </a:extLst>
                 </a:gridCol>
                 <a:gridCol w="1407750">
                   <a:extLst>
                     <a:ext uri="{9D8B030D-6E8A-4147-A177-3AD203B41FA5}">
-                      <a16:colId xmlns:a16="http://schemas.microsoft.com/office/drawing/2014/main" xmlns="" val="20001"/>
+                      <a16:colId xmlns="" xmlns:a16="http://schemas.microsoft.com/office/drawing/2014/main" val="20001"/>
                     </a:ext>
                   </a:extLst>
                 </a:gridCol>
@@ -4563,7 +4564,7 @@
                 </a:tc>
                 <a:extLst>
                   <a:ext uri="{0D108BD9-81ED-4DB2-BD59-A6C34878D82A}">
-                    <a16:rowId xmlns:a16="http://schemas.microsoft.com/office/drawing/2014/main" xmlns="" val="10000"/>
+                    <a16:rowId xmlns="" xmlns:a16="http://schemas.microsoft.com/office/drawing/2014/main" val="10000"/>
                   </a:ext>
                 </a:extLst>
               </a:tr>
@@ -4634,14 +4635,14 @@
                 <a:gridCol w="382900">
                   <a:extLst>
                     <a:ext uri="{9D8B030D-6E8A-4147-A177-3AD203B41FA5}">
-                      <a16:colId xmlns:a16="http://schemas.microsoft.com/office/drawing/2014/main" xmlns="" val="20000"/>
+                      <a16:colId xmlns="" xmlns:a16="http://schemas.microsoft.com/office/drawing/2014/main" val="20000"/>
                     </a:ext>
                   </a:extLst>
                 </a:gridCol>
                 <a:gridCol w="3149100">
                   <a:extLst>
                     <a:ext uri="{9D8B030D-6E8A-4147-A177-3AD203B41FA5}">
-                      <a16:colId xmlns:a16="http://schemas.microsoft.com/office/drawing/2014/main" xmlns="" val="20001"/>
+                      <a16:colId xmlns="" xmlns:a16="http://schemas.microsoft.com/office/drawing/2014/main" val="20001"/>
                     </a:ext>
                   </a:extLst>
                 </a:gridCol>
@@ -4799,7 +4800,7 @@
                 </a:tc>
                 <a:extLst>
                   <a:ext uri="{0D108BD9-81ED-4DB2-BD59-A6C34878D82A}">
-                    <a16:rowId xmlns:a16="http://schemas.microsoft.com/office/drawing/2014/main" xmlns="" val="10000"/>
+                    <a16:rowId xmlns="" xmlns:a16="http://schemas.microsoft.com/office/drawing/2014/main" val="10000"/>
                   </a:ext>
                 </a:extLst>
               </a:tr>
@@ -5028,7 +5029,7 @@
                 </a:tc>
                 <a:extLst>
                   <a:ext uri="{0D108BD9-81ED-4DB2-BD59-A6C34878D82A}">
-                    <a16:rowId xmlns:a16="http://schemas.microsoft.com/office/drawing/2014/main" xmlns="" val="10001"/>
+                    <a16:rowId xmlns="" xmlns:a16="http://schemas.microsoft.com/office/drawing/2014/main" val="10001"/>
                   </a:ext>
                 </a:extLst>
               </a:tr>
@@ -5231,7 +5232,7 @@
                 </a:tc>
                 <a:extLst>
                   <a:ext uri="{0D108BD9-81ED-4DB2-BD59-A6C34878D82A}">
-                    <a16:rowId xmlns:a16="http://schemas.microsoft.com/office/drawing/2014/main" xmlns="" val="10002"/>
+                    <a16:rowId xmlns="" xmlns:a16="http://schemas.microsoft.com/office/drawing/2014/main" val="10002"/>
                   </a:ext>
                 </a:extLst>
               </a:tr>
@@ -8393,7 +8394,7 @@
           <p:cNvPr id="25" name="직사각형 24">
             <a:extLst>
               <a:ext uri="{FF2B5EF4-FFF2-40B4-BE49-F238E27FC236}">
-                <a16:creationId xmlns:a16="http://schemas.microsoft.com/office/drawing/2014/main" xmlns="" id="{B3C0FE6C-9934-4CDA-9D8C-67C836C2B08B}"/>
+                <a16:creationId xmlns="" xmlns:a16="http://schemas.microsoft.com/office/drawing/2014/main" id="{B3C0FE6C-9934-4CDA-9D8C-67C836C2B08B}"/>
               </a:ext>
             </a:extLst>
           </p:cNvPr>
@@ -8445,7 +8446,7 @@
           <p:cNvPr id="26" name="직선 연결선 25">
             <a:extLst>
               <a:ext uri="{FF2B5EF4-FFF2-40B4-BE49-F238E27FC236}">
-                <a16:creationId xmlns:a16="http://schemas.microsoft.com/office/drawing/2014/main" xmlns="" id="{6FCAF67A-66D1-4FB3-98D7-360F38EF73C3}"/>
+                <a16:creationId xmlns="" xmlns:a16="http://schemas.microsoft.com/office/drawing/2014/main" id="{6FCAF67A-66D1-4FB3-98D7-360F38EF73C3}"/>
               </a:ext>
             </a:extLst>
           </p:cNvPr>
@@ -8481,7 +8482,7 @@
           <p:cNvPr id="27" name="직선 연결선 26">
             <a:extLst>
               <a:ext uri="{FF2B5EF4-FFF2-40B4-BE49-F238E27FC236}">
-                <a16:creationId xmlns:a16="http://schemas.microsoft.com/office/drawing/2014/main" xmlns="" id="{CB9FCF60-863F-487E-98DF-70E5CEDE449F}"/>
+                <a16:creationId xmlns="" xmlns:a16="http://schemas.microsoft.com/office/drawing/2014/main" id="{CB9FCF60-863F-487E-98DF-70E5CEDE449F}"/>
               </a:ext>
             </a:extLst>
           </p:cNvPr>
@@ -8517,7 +8518,7 @@
           <p:cNvPr id="28" name="직사각형 27">
             <a:extLst>
               <a:ext uri="{FF2B5EF4-FFF2-40B4-BE49-F238E27FC236}">
-                <a16:creationId xmlns:a16="http://schemas.microsoft.com/office/drawing/2014/main" xmlns="" id="{B3C0FE6C-9934-4CDA-9D8C-67C836C2B08B}"/>
+                <a16:creationId xmlns="" xmlns:a16="http://schemas.microsoft.com/office/drawing/2014/main" id="{B3C0FE6C-9934-4CDA-9D8C-67C836C2B08B}"/>
               </a:ext>
             </a:extLst>
           </p:cNvPr>
@@ -8569,7 +8570,7 @@
           <p:cNvPr id="29" name="직선 연결선 28">
             <a:extLst>
               <a:ext uri="{FF2B5EF4-FFF2-40B4-BE49-F238E27FC236}">
-                <a16:creationId xmlns:a16="http://schemas.microsoft.com/office/drawing/2014/main" xmlns="" id="{6FCAF67A-66D1-4FB3-98D7-360F38EF73C3}"/>
+                <a16:creationId xmlns="" xmlns:a16="http://schemas.microsoft.com/office/drawing/2014/main" id="{6FCAF67A-66D1-4FB3-98D7-360F38EF73C3}"/>
               </a:ext>
             </a:extLst>
           </p:cNvPr>
@@ -8605,7 +8606,7 @@
           <p:cNvPr id="30" name="직선 연결선 29">
             <a:extLst>
               <a:ext uri="{FF2B5EF4-FFF2-40B4-BE49-F238E27FC236}">
-                <a16:creationId xmlns:a16="http://schemas.microsoft.com/office/drawing/2014/main" xmlns="" id="{CB9FCF60-863F-487E-98DF-70E5CEDE449F}"/>
+                <a16:creationId xmlns="" xmlns:a16="http://schemas.microsoft.com/office/drawing/2014/main" id="{CB9FCF60-863F-487E-98DF-70E5CEDE449F}"/>
               </a:ext>
             </a:extLst>
           </p:cNvPr>
@@ -8641,7 +8642,7 @@
           <p:cNvPr id="31" name="직사각형 30">
             <a:extLst>
               <a:ext uri="{FF2B5EF4-FFF2-40B4-BE49-F238E27FC236}">
-                <a16:creationId xmlns:a16="http://schemas.microsoft.com/office/drawing/2014/main" xmlns="" id="{B3C0FE6C-9934-4CDA-9D8C-67C836C2B08B}"/>
+                <a16:creationId xmlns="" xmlns:a16="http://schemas.microsoft.com/office/drawing/2014/main" id="{B3C0FE6C-9934-4CDA-9D8C-67C836C2B08B}"/>
               </a:ext>
             </a:extLst>
           </p:cNvPr>
@@ -8693,7 +8694,7 @@
           <p:cNvPr id="32" name="직선 연결선 31">
             <a:extLst>
               <a:ext uri="{FF2B5EF4-FFF2-40B4-BE49-F238E27FC236}">
-                <a16:creationId xmlns:a16="http://schemas.microsoft.com/office/drawing/2014/main" xmlns="" id="{6FCAF67A-66D1-4FB3-98D7-360F38EF73C3}"/>
+                <a16:creationId xmlns="" xmlns:a16="http://schemas.microsoft.com/office/drawing/2014/main" id="{6FCAF67A-66D1-4FB3-98D7-360F38EF73C3}"/>
               </a:ext>
             </a:extLst>
           </p:cNvPr>
@@ -8729,7 +8730,7 @@
           <p:cNvPr id="33" name="직선 연결선 32">
             <a:extLst>
               <a:ext uri="{FF2B5EF4-FFF2-40B4-BE49-F238E27FC236}">
-                <a16:creationId xmlns:a16="http://schemas.microsoft.com/office/drawing/2014/main" xmlns="" id="{CB9FCF60-863F-487E-98DF-70E5CEDE449F}"/>
+                <a16:creationId xmlns="" xmlns:a16="http://schemas.microsoft.com/office/drawing/2014/main" id="{CB9FCF60-863F-487E-98DF-70E5CEDE449F}"/>
               </a:ext>
             </a:extLst>
           </p:cNvPr>
@@ -8765,7 +8766,7 @@
           <p:cNvPr id="34" name="직사각형 33">
             <a:extLst>
               <a:ext uri="{FF2B5EF4-FFF2-40B4-BE49-F238E27FC236}">
-                <a16:creationId xmlns:a16="http://schemas.microsoft.com/office/drawing/2014/main" xmlns="" id="{B3C0FE6C-9934-4CDA-9D8C-67C836C2B08B}"/>
+                <a16:creationId xmlns="" xmlns:a16="http://schemas.microsoft.com/office/drawing/2014/main" id="{B3C0FE6C-9934-4CDA-9D8C-67C836C2B08B}"/>
               </a:ext>
             </a:extLst>
           </p:cNvPr>
@@ -8817,7 +8818,7 @@
           <p:cNvPr id="35" name="직선 연결선 34">
             <a:extLst>
               <a:ext uri="{FF2B5EF4-FFF2-40B4-BE49-F238E27FC236}">
-                <a16:creationId xmlns:a16="http://schemas.microsoft.com/office/drawing/2014/main" xmlns="" id="{6FCAF67A-66D1-4FB3-98D7-360F38EF73C3}"/>
+                <a16:creationId xmlns="" xmlns:a16="http://schemas.microsoft.com/office/drawing/2014/main" id="{6FCAF67A-66D1-4FB3-98D7-360F38EF73C3}"/>
               </a:ext>
             </a:extLst>
           </p:cNvPr>
@@ -8853,7 +8854,7 @@
           <p:cNvPr id="36" name="직선 연결선 35">
             <a:extLst>
               <a:ext uri="{FF2B5EF4-FFF2-40B4-BE49-F238E27FC236}">
-                <a16:creationId xmlns:a16="http://schemas.microsoft.com/office/drawing/2014/main" xmlns="" id="{CB9FCF60-863F-487E-98DF-70E5CEDE449F}"/>
+                <a16:creationId xmlns="" xmlns:a16="http://schemas.microsoft.com/office/drawing/2014/main" id="{CB9FCF60-863F-487E-98DF-70E5CEDE449F}"/>
               </a:ext>
             </a:extLst>
           </p:cNvPr>
@@ -9269,6 +9270,136 @@
   <p:cSld>
     <p:spTree>
       <p:nvGrpSpPr>
+        <p:cNvPr id="1" name=""/>
+        <p:cNvGrpSpPr/>
+        <p:nvPr/>
+      </p:nvGrpSpPr>
+      <p:grpSpPr>
+        <a:xfrm>
+          <a:off x="0" y="0"/>
+          <a:ext cx="0" cy="0"/>
+          <a:chOff x="0" y="0"/>
+          <a:chExt cx="0" cy="0"/>
+        </a:xfrm>
+      </p:grpSpPr>
+      <p:pic>
+        <p:nvPicPr>
+          <p:cNvPr id="2" name="그림 1"/>
+          <p:cNvPicPr>
+            <a:picLocks noChangeAspect="1"/>
+          </p:cNvPicPr>
+          <p:nvPr/>
+        </p:nvPicPr>
+        <p:blipFill>
+          <a:blip r:embed="rId2">
+            <a:extLst>
+              <a:ext uri="{28A0092B-C50C-407E-A947-70E740481C1C}">
+                <a14:useLocalDpi xmlns:a14="http://schemas.microsoft.com/office/drawing/2010/main" val="0"/>
+              </a:ext>
+            </a:extLst>
+          </a:blip>
+          <a:stretch>
+            <a:fillRect/>
+          </a:stretch>
+        </p:blipFill>
+        <p:spPr>
+          <a:xfrm>
+            <a:off x="1949227" y="255817"/>
+            <a:ext cx="8155816" cy="4588475"/>
+          </a:xfrm>
+          <a:prstGeom prst="rect">
+            <a:avLst/>
+          </a:prstGeom>
+        </p:spPr>
+      </p:pic>
+      <p:grpSp>
+        <p:nvGrpSpPr>
+          <p:cNvPr id="4" name="그룹 3"/>
+          <p:cNvGrpSpPr/>
+          <p:nvPr/>
+        </p:nvGrpSpPr>
+        <p:grpSpPr>
+          <a:xfrm>
+            <a:off x="3184063" y="5064791"/>
+            <a:ext cx="6124694" cy="1793209"/>
+            <a:chOff x="537387" y="2976499"/>
+            <a:chExt cx="11117226" cy="3416443"/>
+          </a:xfrm>
+        </p:grpSpPr>
+        <p:pic>
+          <p:nvPicPr>
+            <p:cNvPr id="5" name="그림 4"/>
+            <p:cNvPicPr>
+              <a:picLocks noChangeAspect="1"/>
+            </p:cNvPicPr>
+            <p:nvPr/>
+          </p:nvPicPr>
+          <p:blipFill>
+            <a:blip r:embed="rId3"/>
+            <a:stretch>
+              <a:fillRect/>
+            </a:stretch>
+          </p:blipFill>
+          <p:spPr>
+            <a:xfrm>
+              <a:off x="537387" y="2976499"/>
+              <a:ext cx="11117226" cy="905001"/>
+            </a:xfrm>
+            <a:prstGeom prst="rect">
+              <a:avLst/>
+            </a:prstGeom>
+          </p:spPr>
+        </p:pic>
+        <p:pic>
+          <p:nvPicPr>
+            <p:cNvPr id="6" name="그림 5"/>
+            <p:cNvPicPr>
+              <a:picLocks noChangeAspect="1"/>
+            </p:cNvPicPr>
+            <p:nvPr/>
+          </p:nvPicPr>
+          <p:blipFill>
+            <a:blip r:embed="rId4"/>
+            <a:stretch>
+              <a:fillRect/>
+            </a:stretch>
+          </p:blipFill>
+          <p:spPr>
+            <a:xfrm>
+              <a:off x="537387" y="4335255"/>
+              <a:ext cx="7449590" cy="2057687"/>
+            </a:xfrm>
+            <a:prstGeom prst="rect">
+              <a:avLst/>
+            </a:prstGeom>
+          </p:spPr>
+        </p:pic>
+      </p:grpSp>
+    </p:spTree>
+    <p:extLst>
+      <p:ext uri="{BB962C8B-B14F-4D97-AF65-F5344CB8AC3E}">
+        <p14:creationId xmlns:p14="http://schemas.microsoft.com/office/powerpoint/2010/main" val="3551699039"/>
+      </p:ext>
+    </p:extLst>
+  </p:cSld>
+  <p:clrMapOvr>
+    <a:masterClrMapping/>
+  </p:clrMapOvr>
+  <p:timing>
+    <p:tnLst>
+      <p:par>
+        <p:cTn id="1" dur="indefinite" restart="never" nodeType="tmRoot"/>
+      </p:par>
+    </p:tnLst>
+  </p:timing>
+</p:sld>
+</file>
+
+<file path=ppt/slides/slide5.xml><?xml version="1.0" encoding="utf-8"?>
+<p:sld xmlns:a="http://schemas.openxmlformats.org/drawingml/2006/main" xmlns:r="http://schemas.openxmlformats.org/officeDocument/2006/relationships" xmlns:p="http://schemas.openxmlformats.org/presentationml/2006/main">
+  <p:cSld>
+    <p:spTree>
+      <p:nvGrpSpPr>
         <p:cNvPr id="1" name="Shape 163"/>
         <p:cNvGrpSpPr/>
         <p:nvPr/>
@@ -9303,14 +9434,14 @@
                 <a:gridCol w="1800980">
                   <a:extLst>
                     <a:ext uri="{9D8B030D-6E8A-4147-A177-3AD203B41FA5}">
-                      <a16:colId xmlns:a16="http://schemas.microsoft.com/office/drawing/2014/main" xmlns="" val="20000"/>
+                      <a16:colId xmlns="" xmlns:a16="http://schemas.microsoft.com/office/drawing/2014/main" val="20000"/>
                     </a:ext>
                   </a:extLst>
                 </a:gridCol>
                 <a:gridCol w="3344270">
                   <a:extLst>
                     <a:ext uri="{9D8B030D-6E8A-4147-A177-3AD203B41FA5}">
-                      <a16:colId xmlns:a16="http://schemas.microsoft.com/office/drawing/2014/main" xmlns="" val="20001"/>
+                      <a16:colId xmlns="" xmlns:a16="http://schemas.microsoft.com/office/drawing/2014/main" val="20001"/>
                     </a:ext>
                   </a:extLst>
                 </a:gridCol>
@@ -9476,7 +9607,7 @@
                 </a:tc>
                 <a:extLst>
                   <a:ext uri="{0D108BD9-81ED-4DB2-BD59-A6C34878D82A}">
-                    <a16:rowId xmlns:a16="http://schemas.microsoft.com/office/drawing/2014/main" xmlns="" val="10000"/>
+                    <a16:rowId xmlns="" xmlns:a16="http://schemas.microsoft.com/office/drawing/2014/main" val="10000"/>
                   </a:ext>
                 </a:extLst>
               </a:tr>
@@ -9657,7 +9788,7 @@
                 </a:tc>
                 <a:extLst>
                   <a:ext uri="{0D108BD9-81ED-4DB2-BD59-A6C34878D82A}">
-                    <a16:rowId xmlns:a16="http://schemas.microsoft.com/office/drawing/2014/main" xmlns="" val="10001"/>
+                    <a16:rowId xmlns="" xmlns:a16="http://schemas.microsoft.com/office/drawing/2014/main" val="10001"/>
                   </a:ext>
                 </a:extLst>
               </a:tr>
@@ -9769,7 +9900,7 @@
                 </a:tc>
                 <a:extLst>
                   <a:ext uri="{0D108BD9-81ED-4DB2-BD59-A6C34878D82A}">
-                    <a16:rowId xmlns:a16="http://schemas.microsoft.com/office/drawing/2014/main" xmlns="" val="10002"/>
+                    <a16:rowId xmlns="" xmlns:a16="http://schemas.microsoft.com/office/drawing/2014/main" val="10002"/>
                   </a:ext>
                 </a:extLst>
               </a:tr>
@@ -9797,14 +9928,14 @@
                 <a:gridCol w="1407750">
                   <a:extLst>
                     <a:ext uri="{9D8B030D-6E8A-4147-A177-3AD203B41FA5}">
-                      <a16:colId xmlns:a16="http://schemas.microsoft.com/office/drawing/2014/main" xmlns="" val="20000"/>
+                      <a16:colId xmlns="" xmlns:a16="http://schemas.microsoft.com/office/drawing/2014/main" val="20000"/>
                     </a:ext>
                   </a:extLst>
                 </a:gridCol>
                 <a:gridCol w="1407750">
                   <a:extLst>
                     <a:ext uri="{9D8B030D-6E8A-4147-A177-3AD203B41FA5}">
-                      <a16:colId xmlns:a16="http://schemas.microsoft.com/office/drawing/2014/main" xmlns="" val="20001"/>
+                      <a16:colId xmlns="" xmlns:a16="http://schemas.microsoft.com/office/drawing/2014/main" val="20001"/>
                     </a:ext>
                   </a:extLst>
                 </a:gridCol>
@@ -9962,7 +10093,7 @@
                 </a:tc>
                 <a:extLst>
                   <a:ext uri="{0D108BD9-81ED-4DB2-BD59-A6C34878D82A}">
-                    <a16:rowId xmlns:a16="http://schemas.microsoft.com/office/drawing/2014/main" xmlns="" val="10000"/>
+                    <a16:rowId xmlns="" xmlns:a16="http://schemas.microsoft.com/office/drawing/2014/main" val="10000"/>
                   </a:ext>
                 </a:extLst>
               </a:tr>
@@ -9990,14 +10121,14 @@
                 <a:gridCol w="1407750">
                   <a:extLst>
                     <a:ext uri="{9D8B030D-6E8A-4147-A177-3AD203B41FA5}">
-                      <a16:colId xmlns:a16="http://schemas.microsoft.com/office/drawing/2014/main" xmlns="" val="20000"/>
+                      <a16:colId xmlns="" xmlns:a16="http://schemas.microsoft.com/office/drawing/2014/main" val="20000"/>
                     </a:ext>
                   </a:extLst>
                 </a:gridCol>
                 <a:gridCol w="1407750">
                   <a:extLst>
                     <a:ext uri="{9D8B030D-6E8A-4147-A177-3AD203B41FA5}">
-                      <a16:colId xmlns:a16="http://schemas.microsoft.com/office/drawing/2014/main" xmlns="" val="20001"/>
+                      <a16:colId xmlns="" xmlns:a16="http://schemas.microsoft.com/office/drawing/2014/main" val="20001"/>
                     </a:ext>
                   </a:extLst>
                 </a:gridCol>
@@ -10155,7 +10286,7 @@
                 </a:tc>
                 <a:extLst>
                   <a:ext uri="{0D108BD9-81ED-4DB2-BD59-A6C34878D82A}">
-                    <a16:rowId xmlns:a16="http://schemas.microsoft.com/office/drawing/2014/main" xmlns="" val="10000"/>
+                    <a16:rowId xmlns="" xmlns:a16="http://schemas.microsoft.com/office/drawing/2014/main" val="10000"/>
                   </a:ext>
                 </a:extLst>
               </a:tr>
@@ -10226,14 +10357,14 @@
                 <a:gridCol w="382900">
                   <a:extLst>
                     <a:ext uri="{9D8B030D-6E8A-4147-A177-3AD203B41FA5}">
-                      <a16:colId xmlns:a16="http://schemas.microsoft.com/office/drawing/2014/main" xmlns="" val="20000"/>
+                      <a16:colId xmlns="" xmlns:a16="http://schemas.microsoft.com/office/drawing/2014/main" val="20000"/>
                     </a:ext>
                   </a:extLst>
                 </a:gridCol>
                 <a:gridCol w="3149100">
                   <a:extLst>
                     <a:ext uri="{9D8B030D-6E8A-4147-A177-3AD203B41FA5}">
-                      <a16:colId xmlns:a16="http://schemas.microsoft.com/office/drawing/2014/main" xmlns="" val="20001"/>
+                      <a16:colId xmlns="" xmlns:a16="http://schemas.microsoft.com/office/drawing/2014/main" val="20001"/>
                     </a:ext>
                   </a:extLst>
                 </a:gridCol>
@@ -10391,7 +10522,7 @@
                 </a:tc>
                 <a:extLst>
                   <a:ext uri="{0D108BD9-81ED-4DB2-BD59-A6C34878D82A}">
-                    <a16:rowId xmlns:a16="http://schemas.microsoft.com/office/drawing/2014/main" xmlns="" val="10000"/>
+                    <a16:rowId xmlns="" xmlns:a16="http://schemas.microsoft.com/office/drawing/2014/main" val="10000"/>
                   </a:ext>
                 </a:extLst>
               </a:tr>
@@ -10604,7 +10735,7 @@
                 </a:tc>
                 <a:extLst>
                   <a:ext uri="{0D108BD9-81ED-4DB2-BD59-A6C34878D82A}">
-                    <a16:rowId xmlns:a16="http://schemas.microsoft.com/office/drawing/2014/main" xmlns="" val="10001"/>
+                    <a16:rowId xmlns="" xmlns:a16="http://schemas.microsoft.com/office/drawing/2014/main" val="10001"/>
                   </a:ext>
                 </a:extLst>
               </a:tr>
@@ -10855,7 +10986,7 @@
                 </a:tc>
                 <a:extLst>
                   <a:ext uri="{0D108BD9-81ED-4DB2-BD59-A6C34878D82A}">
-                    <a16:rowId xmlns:a16="http://schemas.microsoft.com/office/drawing/2014/main" xmlns="" val="10002"/>
+                    <a16:rowId xmlns="" xmlns:a16="http://schemas.microsoft.com/office/drawing/2014/main" val="10002"/>
                   </a:ext>
                 </a:extLst>
               </a:tr>
@@ -11084,7 +11215,7 @@
                 </a:tc>
                 <a:extLst>
                   <a:ext uri="{0D108BD9-81ED-4DB2-BD59-A6C34878D82A}">
-                    <a16:rowId xmlns:a16="http://schemas.microsoft.com/office/drawing/2014/main" xmlns="" val="10003"/>
+                    <a16:rowId xmlns="" xmlns:a16="http://schemas.microsoft.com/office/drawing/2014/main" val="10003"/>
                   </a:ext>
                 </a:extLst>
               </a:tr>
@@ -12305,7 +12436,7 @@
           <p:cNvPr id="55" name="그룹 54">
             <a:extLst>
               <a:ext uri="{FF2B5EF4-FFF2-40B4-BE49-F238E27FC236}">
-                <a16:creationId xmlns:a16="http://schemas.microsoft.com/office/drawing/2014/main" xmlns="" id="{62A18DB4-458D-4405-AF44-ABEAF81A218F}"/>
+                <a16:creationId xmlns="" xmlns:a16="http://schemas.microsoft.com/office/drawing/2014/main" id="{62A18DB4-458D-4405-AF44-ABEAF81A218F}"/>
               </a:ext>
             </a:extLst>
           </p:cNvPr>
@@ -12325,7 +12456,7 @@
             <p:cNvPr id="56" name="그룹 55">
               <a:extLst>
                 <a:ext uri="{FF2B5EF4-FFF2-40B4-BE49-F238E27FC236}">
-                  <a16:creationId xmlns:a16="http://schemas.microsoft.com/office/drawing/2014/main" xmlns="" id="{8834A7D0-76B4-45F1-B59D-FD8735D4521F}"/>
+                  <a16:creationId xmlns="" xmlns:a16="http://schemas.microsoft.com/office/drawing/2014/main" id="{8834A7D0-76B4-45F1-B59D-FD8735D4521F}"/>
                 </a:ext>
               </a:extLst>
             </p:cNvPr>
@@ -12345,7 +12476,7 @@
               <p:cNvPr id="60" name="직사각형 59">
                 <a:extLst>
                   <a:ext uri="{FF2B5EF4-FFF2-40B4-BE49-F238E27FC236}">
-                    <a16:creationId xmlns:a16="http://schemas.microsoft.com/office/drawing/2014/main" xmlns="" id="{5866C11F-D83C-4D2C-B5A3-F7B5B1E82F04}"/>
+                    <a16:creationId xmlns="" xmlns:a16="http://schemas.microsoft.com/office/drawing/2014/main" id="{5866C11F-D83C-4D2C-B5A3-F7B5B1E82F04}"/>
                   </a:ext>
                 </a:extLst>
               </p:cNvPr>
@@ -12465,7 +12596,7 @@
               <p:cNvPr id="61" name="직사각형 60">
                 <a:extLst>
                   <a:ext uri="{FF2B5EF4-FFF2-40B4-BE49-F238E27FC236}">
-                    <a16:creationId xmlns:a16="http://schemas.microsoft.com/office/drawing/2014/main" xmlns="" id="{B3C0FE6C-9934-4CDA-9D8C-67C836C2B08B}"/>
+                    <a16:creationId xmlns="" xmlns:a16="http://schemas.microsoft.com/office/drawing/2014/main" id="{B3C0FE6C-9934-4CDA-9D8C-67C836C2B08B}"/>
                   </a:ext>
                 </a:extLst>
               </p:cNvPr>
@@ -12518,7 +12649,7 @@
             <p:cNvPr id="57" name="그룹 56">
               <a:extLst>
                 <a:ext uri="{FF2B5EF4-FFF2-40B4-BE49-F238E27FC236}">
-                  <a16:creationId xmlns:a16="http://schemas.microsoft.com/office/drawing/2014/main" xmlns="" id="{37933C1A-A1E4-40BC-B5C7-C6CF8129EF2C}"/>
+                  <a16:creationId xmlns="" xmlns:a16="http://schemas.microsoft.com/office/drawing/2014/main" id="{37933C1A-A1E4-40BC-B5C7-C6CF8129EF2C}"/>
                 </a:ext>
               </a:extLst>
             </p:cNvPr>
@@ -12538,7 +12669,7 @@
               <p:cNvPr id="58" name="직선 연결선 57">
                 <a:extLst>
                   <a:ext uri="{FF2B5EF4-FFF2-40B4-BE49-F238E27FC236}">
-                    <a16:creationId xmlns:a16="http://schemas.microsoft.com/office/drawing/2014/main" xmlns="" id="{6FCAF67A-66D1-4FB3-98D7-360F38EF73C3}"/>
+                    <a16:creationId xmlns="" xmlns:a16="http://schemas.microsoft.com/office/drawing/2014/main" id="{6FCAF67A-66D1-4FB3-98D7-360F38EF73C3}"/>
                   </a:ext>
                 </a:extLst>
               </p:cNvPr>
@@ -12574,7 +12705,7 @@
               <p:cNvPr id="59" name="직선 연결선 58">
                 <a:extLst>
                   <a:ext uri="{FF2B5EF4-FFF2-40B4-BE49-F238E27FC236}">
-                    <a16:creationId xmlns:a16="http://schemas.microsoft.com/office/drawing/2014/main" xmlns="" id="{CB9FCF60-863F-487E-98DF-70E5CEDE449F}"/>
+                    <a16:creationId xmlns="" xmlns:a16="http://schemas.microsoft.com/office/drawing/2014/main" id="{CB9FCF60-863F-487E-98DF-70E5CEDE449F}"/>
                   </a:ext>
                 </a:extLst>
               </p:cNvPr>
@@ -12650,7 +12781,7 @@
             <p:cNvPr id="73" name="그룹 72">
               <a:extLst>
                 <a:ext uri="{FF2B5EF4-FFF2-40B4-BE49-F238E27FC236}">
-                  <a16:creationId xmlns:a16="http://schemas.microsoft.com/office/drawing/2014/main" xmlns="" id="{62A18DB4-458D-4405-AF44-ABEAF81A218F}"/>
+                  <a16:creationId xmlns="" xmlns:a16="http://schemas.microsoft.com/office/drawing/2014/main" id="{62A18DB4-458D-4405-AF44-ABEAF81A218F}"/>
                 </a:ext>
               </a:extLst>
             </p:cNvPr>
@@ -12670,7 +12801,7 @@
               <p:cNvPr id="74" name="그룹 73">
                 <a:extLst>
                   <a:ext uri="{FF2B5EF4-FFF2-40B4-BE49-F238E27FC236}">
-                    <a16:creationId xmlns:a16="http://schemas.microsoft.com/office/drawing/2014/main" xmlns="" id="{8834A7D0-76B4-45F1-B59D-FD8735D4521F}"/>
+                    <a16:creationId xmlns="" xmlns:a16="http://schemas.microsoft.com/office/drawing/2014/main" id="{8834A7D0-76B4-45F1-B59D-FD8735D4521F}"/>
                   </a:ext>
                 </a:extLst>
               </p:cNvPr>
@@ -12690,7 +12821,7 @@
                 <p:cNvPr id="78" name="직사각형 77">
                   <a:extLst>
                     <a:ext uri="{FF2B5EF4-FFF2-40B4-BE49-F238E27FC236}">
-                      <a16:creationId xmlns:a16="http://schemas.microsoft.com/office/drawing/2014/main" xmlns="" id="{5866C11F-D83C-4D2C-B5A3-F7B5B1E82F04}"/>
+                      <a16:creationId xmlns="" xmlns:a16="http://schemas.microsoft.com/office/drawing/2014/main" id="{5866C11F-D83C-4D2C-B5A3-F7B5B1E82F04}"/>
                     </a:ext>
                   </a:extLst>
                 </p:cNvPr>
@@ -12810,7 +12941,7 @@
                 <p:cNvPr id="79" name="직사각형 78">
                   <a:extLst>
                     <a:ext uri="{FF2B5EF4-FFF2-40B4-BE49-F238E27FC236}">
-                      <a16:creationId xmlns:a16="http://schemas.microsoft.com/office/drawing/2014/main" xmlns="" id="{B3C0FE6C-9934-4CDA-9D8C-67C836C2B08B}"/>
+                      <a16:creationId xmlns="" xmlns:a16="http://schemas.microsoft.com/office/drawing/2014/main" id="{B3C0FE6C-9934-4CDA-9D8C-67C836C2B08B}"/>
                     </a:ext>
                   </a:extLst>
                 </p:cNvPr>
@@ -12863,7 +12994,7 @@
               <p:cNvPr id="75" name="그룹 74">
                 <a:extLst>
                   <a:ext uri="{FF2B5EF4-FFF2-40B4-BE49-F238E27FC236}">
-                    <a16:creationId xmlns:a16="http://schemas.microsoft.com/office/drawing/2014/main" xmlns="" id="{37933C1A-A1E4-40BC-B5C7-C6CF8129EF2C}"/>
+                    <a16:creationId xmlns="" xmlns:a16="http://schemas.microsoft.com/office/drawing/2014/main" id="{37933C1A-A1E4-40BC-B5C7-C6CF8129EF2C}"/>
                   </a:ext>
                 </a:extLst>
               </p:cNvPr>
@@ -12883,7 +13014,7 @@
                 <p:cNvPr id="76" name="직선 연결선 75">
                   <a:extLst>
                     <a:ext uri="{FF2B5EF4-FFF2-40B4-BE49-F238E27FC236}">
-                      <a16:creationId xmlns:a16="http://schemas.microsoft.com/office/drawing/2014/main" xmlns="" id="{6FCAF67A-66D1-4FB3-98D7-360F38EF73C3}"/>
+                      <a16:creationId xmlns="" xmlns:a16="http://schemas.microsoft.com/office/drawing/2014/main" id="{6FCAF67A-66D1-4FB3-98D7-360F38EF73C3}"/>
                     </a:ext>
                   </a:extLst>
                 </p:cNvPr>
@@ -12919,7 +13050,7 @@
                 <p:cNvPr id="77" name="직선 연결선 76">
                   <a:extLst>
                     <a:ext uri="{FF2B5EF4-FFF2-40B4-BE49-F238E27FC236}">
-                      <a16:creationId xmlns:a16="http://schemas.microsoft.com/office/drawing/2014/main" xmlns="" id="{CB9FCF60-863F-487E-98DF-70E5CEDE449F}"/>
+                      <a16:creationId xmlns="" xmlns:a16="http://schemas.microsoft.com/office/drawing/2014/main" id="{CB9FCF60-863F-487E-98DF-70E5CEDE449F}"/>
                     </a:ext>
                   </a:extLst>
                 </p:cNvPr>
@@ -13006,7 +13137,7 @@
           <p:cNvPr id="154" name="그룹 153">
             <a:extLst>
               <a:ext uri="{FF2B5EF4-FFF2-40B4-BE49-F238E27FC236}">
-                <a16:creationId xmlns:a16="http://schemas.microsoft.com/office/drawing/2014/main" xmlns="" id="{62A18DB4-458D-4405-AF44-ABEAF81A218F}"/>
+                <a16:creationId xmlns="" xmlns:a16="http://schemas.microsoft.com/office/drawing/2014/main" id="{62A18DB4-458D-4405-AF44-ABEAF81A218F}"/>
               </a:ext>
             </a:extLst>
           </p:cNvPr>
@@ -13026,7 +13157,7 @@
             <p:cNvPr id="155" name="그룹 154">
               <a:extLst>
                 <a:ext uri="{FF2B5EF4-FFF2-40B4-BE49-F238E27FC236}">
-                  <a16:creationId xmlns:a16="http://schemas.microsoft.com/office/drawing/2014/main" xmlns="" id="{8834A7D0-76B4-45F1-B59D-FD8735D4521F}"/>
+                  <a16:creationId xmlns="" xmlns:a16="http://schemas.microsoft.com/office/drawing/2014/main" id="{8834A7D0-76B4-45F1-B59D-FD8735D4521F}"/>
                 </a:ext>
               </a:extLst>
             </p:cNvPr>
@@ -13046,7 +13177,7 @@
               <p:cNvPr id="159" name="직사각형 158">
                 <a:extLst>
                   <a:ext uri="{FF2B5EF4-FFF2-40B4-BE49-F238E27FC236}">
-                    <a16:creationId xmlns:a16="http://schemas.microsoft.com/office/drawing/2014/main" xmlns="" id="{5866C11F-D83C-4D2C-B5A3-F7B5B1E82F04}"/>
+                    <a16:creationId xmlns="" xmlns:a16="http://schemas.microsoft.com/office/drawing/2014/main" id="{5866C11F-D83C-4D2C-B5A3-F7B5B1E82F04}"/>
                   </a:ext>
                 </a:extLst>
               </p:cNvPr>
@@ -13166,7 +13297,7 @@
               <p:cNvPr id="160" name="직사각형 159">
                 <a:extLst>
                   <a:ext uri="{FF2B5EF4-FFF2-40B4-BE49-F238E27FC236}">
-                    <a16:creationId xmlns:a16="http://schemas.microsoft.com/office/drawing/2014/main" xmlns="" id="{B3C0FE6C-9934-4CDA-9D8C-67C836C2B08B}"/>
+                    <a16:creationId xmlns="" xmlns:a16="http://schemas.microsoft.com/office/drawing/2014/main" id="{B3C0FE6C-9934-4CDA-9D8C-67C836C2B08B}"/>
                   </a:ext>
                 </a:extLst>
               </p:cNvPr>
@@ -13219,7 +13350,7 @@
             <p:cNvPr id="156" name="그룹 155">
               <a:extLst>
                 <a:ext uri="{FF2B5EF4-FFF2-40B4-BE49-F238E27FC236}">
-                  <a16:creationId xmlns:a16="http://schemas.microsoft.com/office/drawing/2014/main" xmlns="" id="{37933C1A-A1E4-40BC-B5C7-C6CF8129EF2C}"/>
+                  <a16:creationId xmlns="" xmlns:a16="http://schemas.microsoft.com/office/drawing/2014/main" id="{37933C1A-A1E4-40BC-B5C7-C6CF8129EF2C}"/>
                 </a:ext>
               </a:extLst>
             </p:cNvPr>
@@ -13239,7 +13370,7 @@
               <p:cNvPr id="157" name="직선 연결선 156">
                 <a:extLst>
                   <a:ext uri="{FF2B5EF4-FFF2-40B4-BE49-F238E27FC236}">
-                    <a16:creationId xmlns:a16="http://schemas.microsoft.com/office/drawing/2014/main" xmlns="" id="{6FCAF67A-66D1-4FB3-98D7-360F38EF73C3}"/>
+                    <a16:creationId xmlns="" xmlns:a16="http://schemas.microsoft.com/office/drawing/2014/main" id="{6FCAF67A-66D1-4FB3-98D7-360F38EF73C3}"/>
                   </a:ext>
                 </a:extLst>
               </p:cNvPr>
@@ -13275,7 +13406,7 @@
               <p:cNvPr id="158" name="직선 연결선 157">
                 <a:extLst>
                   <a:ext uri="{FF2B5EF4-FFF2-40B4-BE49-F238E27FC236}">
-                    <a16:creationId xmlns:a16="http://schemas.microsoft.com/office/drawing/2014/main" xmlns="" id="{CB9FCF60-863F-487E-98DF-70E5CEDE449F}"/>
+                    <a16:creationId xmlns="" xmlns:a16="http://schemas.microsoft.com/office/drawing/2014/main" id="{CB9FCF60-863F-487E-98DF-70E5CEDE449F}"/>
                   </a:ext>
                 </a:extLst>
               </p:cNvPr>
@@ -13351,7 +13482,7 @@
             <p:cNvPr id="163" name="그룹 162">
               <a:extLst>
                 <a:ext uri="{FF2B5EF4-FFF2-40B4-BE49-F238E27FC236}">
-                  <a16:creationId xmlns:a16="http://schemas.microsoft.com/office/drawing/2014/main" xmlns="" id="{62A18DB4-458D-4405-AF44-ABEAF81A218F}"/>
+                  <a16:creationId xmlns="" xmlns:a16="http://schemas.microsoft.com/office/drawing/2014/main" id="{62A18DB4-458D-4405-AF44-ABEAF81A218F}"/>
                 </a:ext>
               </a:extLst>
             </p:cNvPr>
@@ -13371,7 +13502,7 @@
               <p:cNvPr id="169" name="그룹 168">
                 <a:extLst>
                   <a:ext uri="{FF2B5EF4-FFF2-40B4-BE49-F238E27FC236}">
-                    <a16:creationId xmlns:a16="http://schemas.microsoft.com/office/drawing/2014/main" xmlns="" id="{8834A7D0-76B4-45F1-B59D-FD8735D4521F}"/>
+                    <a16:creationId xmlns="" xmlns:a16="http://schemas.microsoft.com/office/drawing/2014/main" id="{8834A7D0-76B4-45F1-B59D-FD8735D4521F}"/>
                   </a:ext>
                 </a:extLst>
               </p:cNvPr>
@@ -13391,7 +13522,7 @@
                 <p:cNvPr id="173" name="직사각형 172">
                   <a:extLst>
                     <a:ext uri="{FF2B5EF4-FFF2-40B4-BE49-F238E27FC236}">
-                      <a16:creationId xmlns:a16="http://schemas.microsoft.com/office/drawing/2014/main" xmlns="" id="{5866C11F-D83C-4D2C-B5A3-F7B5B1E82F04}"/>
+                      <a16:creationId xmlns="" xmlns:a16="http://schemas.microsoft.com/office/drawing/2014/main" id="{5866C11F-D83C-4D2C-B5A3-F7B5B1E82F04}"/>
                     </a:ext>
                   </a:extLst>
                 </p:cNvPr>
@@ -13511,7 +13642,7 @@
                 <p:cNvPr id="174" name="직사각형 173">
                   <a:extLst>
                     <a:ext uri="{FF2B5EF4-FFF2-40B4-BE49-F238E27FC236}">
-                      <a16:creationId xmlns:a16="http://schemas.microsoft.com/office/drawing/2014/main" xmlns="" id="{B3C0FE6C-9934-4CDA-9D8C-67C836C2B08B}"/>
+                      <a16:creationId xmlns="" xmlns:a16="http://schemas.microsoft.com/office/drawing/2014/main" id="{B3C0FE6C-9934-4CDA-9D8C-67C836C2B08B}"/>
                     </a:ext>
                   </a:extLst>
                 </p:cNvPr>
@@ -13564,7 +13695,7 @@
               <p:cNvPr id="170" name="그룹 169">
                 <a:extLst>
                   <a:ext uri="{FF2B5EF4-FFF2-40B4-BE49-F238E27FC236}">
-                    <a16:creationId xmlns:a16="http://schemas.microsoft.com/office/drawing/2014/main" xmlns="" id="{37933C1A-A1E4-40BC-B5C7-C6CF8129EF2C}"/>
+                    <a16:creationId xmlns="" xmlns:a16="http://schemas.microsoft.com/office/drawing/2014/main" id="{37933C1A-A1E4-40BC-B5C7-C6CF8129EF2C}"/>
                   </a:ext>
                 </a:extLst>
               </p:cNvPr>
@@ -13584,7 +13715,7 @@
                 <p:cNvPr id="171" name="직선 연결선 170">
                   <a:extLst>
                     <a:ext uri="{FF2B5EF4-FFF2-40B4-BE49-F238E27FC236}">
-                      <a16:creationId xmlns:a16="http://schemas.microsoft.com/office/drawing/2014/main" xmlns="" id="{6FCAF67A-66D1-4FB3-98D7-360F38EF73C3}"/>
+                      <a16:creationId xmlns="" xmlns:a16="http://schemas.microsoft.com/office/drawing/2014/main" id="{6FCAF67A-66D1-4FB3-98D7-360F38EF73C3}"/>
                     </a:ext>
                   </a:extLst>
                 </p:cNvPr>
@@ -13620,7 +13751,7 @@
                 <p:cNvPr id="172" name="직선 연결선 171">
                   <a:extLst>
                     <a:ext uri="{FF2B5EF4-FFF2-40B4-BE49-F238E27FC236}">
-                      <a16:creationId xmlns:a16="http://schemas.microsoft.com/office/drawing/2014/main" xmlns="" id="{CB9FCF60-863F-487E-98DF-70E5CEDE449F}"/>
+                      <a16:creationId xmlns="" xmlns:a16="http://schemas.microsoft.com/office/drawing/2014/main" id="{CB9FCF60-863F-487E-98DF-70E5CEDE449F}"/>
                     </a:ext>
                   </a:extLst>
                 </p:cNvPr>
@@ -13707,7 +13838,7 @@
           <p:cNvPr id="175" name="그룹 174">
             <a:extLst>
               <a:ext uri="{FF2B5EF4-FFF2-40B4-BE49-F238E27FC236}">
-                <a16:creationId xmlns:a16="http://schemas.microsoft.com/office/drawing/2014/main" xmlns="" id="{62A18DB4-458D-4405-AF44-ABEAF81A218F}"/>
+                <a16:creationId xmlns="" xmlns:a16="http://schemas.microsoft.com/office/drawing/2014/main" id="{62A18DB4-458D-4405-AF44-ABEAF81A218F}"/>
               </a:ext>
             </a:extLst>
           </p:cNvPr>
@@ -13727,7 +13858,7 @@
             <p:cNvPr id="176" name="그룹 175">
               <a:extLst>
                 <a:ext uri="{FF2B5EF4-FFF2-40B4-BE49-F238E27FC236}">
-                  <a16:creationId xmlns:a16="http://schemas.microsoft.com/office/drawing/2014/main" xmlns="" id="{8834A7D0-76B4-45F1-B59D-FD8735D4521F}"/>
+                  <a16:creationId xmlns="" xmlns:a16="http://schemas.microsoft.com/office/drawing/2014/main" id="{8834A7D0-76B4-45F1-B59D-FD8735D4521F}"/>
                 </a:ext>
               </a:extLst>
             </p:cNvPr>
@@ -13747,7 +13878,7 @@
               <p:cNvPr id="180" name="직사각형 179">
                 <a:extLst>
                   <a:ext uri="{FF2B5EF4-FFF2-40B4-BE49-F238E27FC236}">
-                    <a16:creationId xmlns:a16="http://schemas.microsoft.com/office/drawing/2014/main" xmlns="" id="{5866C11F-D83C-4D2C-B5A3-F7B5B1E82F04}"/>
+                    <a16:creationId xmlns="" xmlns:a16="http://schemas.microsoft.com/office/drawing/2014/main" id="{5866C11F-D83C-4D2C-B5A3-F7B5B1E82F04}"/>
                   </a:ext>
                 </a:extLst>
               </p:cNvPr>
@@ -13867,7 +13998,7 @@
               <p:cNvPr id="181" name="직사각형 180">
                 <a:extLst>
                   <a:ext uri="{FF2B5EF4-FFF2-40B4-BE49-F238E27FC236}">
-                    <a16:creationId xmlns:a16="http://schemas.microsoft.com/office/drawing/2014/main" xmlns="" id="{B3C0FE6C-9934-4CDA-9D8C-67C836C2B08B}"/>
+                    <a16:creationId xmlns="" xmlns:a16="http://schemas.microsoft.com/office/drawing/2014/main" id="{B3C0FE6C-9934-4CDA-9D8C-67C836C2B08B}"/>
                   </a:ext>
                 </a:extLst>
               </p:cNvPr>
@@ -13920,7 +14051,7 @@
             <p:cNvPr id="177" name="그룹 176">
               <a:extLst>
                 <a:ext uri="{FF2B5EF4-FFF2-40B4-BE49-F238E27FC236}">
-                  <a16:creationId xmlns:a16="http://schemas.microsoft.com/office/drawing/2014/main" xmlns="" id="{37933C1A-A1E4-40BC-B5C7-C6CF8129EF2C}"/>
+                  <a16:creationId xmlns="" xmlns:a16="http://schemas.microsoft.com/office/drawing/2014/main" id="{37933C1A-A1E4-40BC-B5C7-C6CF8129EF2C}"/>
                 </a:ext>
               </a:extLst>
             </p:cNvPr>
@@ -13940,7 +14071,7 @@
               <p:cNvPr id="178" name="직선 연결선 177">
                 <a:extLst>
                   <a:ext uri="{FF2B5EF4-FFF2-40B4-BE49-F238E27FC236}">
-                    <a16:creationId xmlns:a16="http://schemas.microsoft.com/office/drawing/2014/main" xmlns="" id="{6FCAF67A-66D1-4FB3-98D7-360F38EF73C3}"/>
+                    <a16:creationId xmlns="" xmlns:a16="http://schemas.microsoft.com/office/drawing/2014/main" id="{6FCAF67A-66D1-4FB3-98D7-360F38EF73C3}"/>
                   </a:ext>
                 </a:extLst>
               </p:cNvPr>
@@ -13976,7 +14107,7 @@
               <p:cNvPr id="179" name="직선 연결선 178">
                 <a:extLst>
                   <a:ext uri="{FF2B5EF4-FFF2-40B4-BE49-F238E27FC236}">
-                    <a16:creationId xmlns:a16="http://schemas.microsoft.com/office/drawing/2014/main" xmlns="" id="{CB9FCF60-863F-487E-98DF-70E5CEDE449F}"/>
+                    <a16:creationId xmlns="" xmlns:a16="http://schemas.microsoft.com/office/drawing/2014/main" id="{CB9FCF60-863F-487E-98DF-70E5CEDE449F}"/>
                   </a:ext>
                 </a:extLst>
               </p:cNvPr>
@@ -14494,7 +14625,7 @@
               <p:cNvPr id="82" name="그룹 81">
                 <a:extLst>
                   <a:ext uri="{FF2B5EF4-FFF2-40B4-BE49-F238E27FC236}">
-                    <a16:creationId xmlns:a16="http://schemas.microsoft.com/office/drawing/2014/main" xmlns="" id="{62A18DB4-458D-4405-AF44-ABEAF81A218F}"/>
+                    <a16:creationId xmlns="" xmlns:a16="http://schemas.microsoft.com/office/drawing/2014/main" id="{62A18DB4-458D-4405-AF44-ABEAF81A218F}"/>
                   </a:ext>
                 </a:extLst>
               </p:cNvPr>
@@ -14514,7 +14645,7 @@
                 <p:cNvPr id="83" name="그룹 82">
                   <a:extLst>
                     <a:ext uri="{FF2B5EF4-FFF2-40B4-BE49-F238E27FC236}">
-                      <a16:creationId xmlns:a16="http://schemas.microsoft.com/office/drawing/2014/main" xmlns="" id="{8834A7D0-76B4-45F1-B59D-FD8735D4521F}"/>
+                      <a16:creationId xmlns="" xmlns:a16="http://schemas.microsoft.com/office/drawing/2014/main" id="{8834A7D0-76B4-45F1-B59D-FD8735D4521F}"/>
                     </a:ext>
                   </a:extLst>
                 </p:cNvPr>
@@ -14534,7 +14665,7 @@
                   <p:cNvPr id="87" name="직사각형 86">
                     <a:extLst>
                       <a:ext uri="{FF2B5EF4-FFF2-40B4-BE49-F238E27FC236}">
-                        <a16:creationId xmlns:a16="http://schemas.microsoft.com/office/drawing/2014/main" xmlns="" id="{5866C11F-D83C-4D2C-B5A3-F7B5B1E82F04}"/>
+                        <a16:creationId xmlns="" xmlns:a16="http://schemas.microsoft.com/office/drawing/2014/main" id="{5866C11F-D83C-4D2C-B5A3-F7B5B1E82F04}"/>
                       </a:ext>
                     </a:extLst>
                   </p:cNvPr>
@@ -14662,7 +14793,7 @@
                   <p:cNvPr id="88" name="직사각형 87">
                     <a:extLst>
                       <a:ext uri="{FF2B5EF4-FFF2-40B4-BE49-F238E27FC236}">
-                        <a16:creationId xmlns:a16="http://schemas.microsoft.com/office/drawing/2014/main" xmlns="" id="{B3C0FE6C-9934-4CDA-9D8C-67C836C2B08B}"/>
+                        <a16:creationId xmlns="" xmlns:a16="http://schemas.microsoft.com/office/drawing/2014/main" id="{B3C0FE6C-9934-4CDA-9D8C-67C836C2B08B}"/>
                       </a:ext>
                     </a:extLst>
                   </p:cNvPr>
@@ -14715,7 +14846,7 @@
                 <p:cNvPr id="84" name="그룹 83">
                   <a:extLst>
                     <a:ext uri="{FF2B5EF4-FFF2-40B4-BE49-F238E27FC236}">
-                      <a16:creationId xmlns:a16="http://schemas.microsoft.com/office/drawing/2014/main" xmlns="" id="{37933C1A-A1E4-40BC-B5C7-C6CF8129EF2C}"/>
+                      <a16:creationId xmlns="" xmlns:a16="http://schemas.microsoft.com/office/drawing/2014/main" id="{37933C1A-A1E4-40BC-B5C7-C6CF8129EF2C}"/>
                     </a:ext>
                   </a:extLst>
                 </p:cNvPr>
@@ -14735,7 +14866,7 @@
                   <p:cNvPr id="85" name="직선 연결선 84">
                     <a:extLst>
                       <a:ext uri="{FF2B5EF4-FFF2-40B4-BE49-F238E27FC236}">
-                        <a16:creationId xmlns:a16="http://schemas.microsoft.com/office/drawing/2014/main" xmlns="" id="{6FCAF67A-66D1-4FB3-98D7-360F38EF73C3}"/>
+                        <a16:creationId xmlns="" xmlns:a16="http://schemas.microsoft.com/office/drawing/2014/main" id="{6FCAF67A-66D1-4FB3-98D7-360F38EF73C3}"/>
                       </a:ext>
                     </a:extLst>
                   </p:cNvPr>
@@ -14771,7 +14902,7 @@
                   <p:cNvPr id="86" name="직선 연결선 85">
                     <a:extLst>
                       <a:ext uri="{FF2B5EF4-FFF2-40B4-BE49-F238E27FC236}">
-                        <a16:creationId xmlns:a16="http://schemas.microsoft.com/office/drawing/2014/main" xmlns="" id="{CB9FCF60-863F-487E-98DF-70E5CEDE449F}"/>
+                        <a16:creationId xmlns="" xmlns:a16="http://schemas.microsoft.com/office/drawing/2014/main" id="{CB9FCF60-863F-487E-98DF-70E5CEDE449F}"/>
                       </a:ext>
                     </a:extLst>
                   </p:cNvPr>
@@ -14894,7 +15025,7 @@
 </p:sld>
 </file>
 
-<file path=ppt/slides/slide5.xml><?xml version="1.0" encoding="utf-8"?>
+<file path=ppt/slides/slide6.xml><?xml version="1.0" encoding="utf-8"?>
 <p:sld xmlns:a="http://schemas.openxmlformats.org/drawingml/2006/main" xmlns:r="http://schemas.openxmlformats.org/officeDocument/2006/relationships" xmlns:p="http://schemas.openxmlformats.org/presentationml/2006/main">
   <p:cSld>
     <p:spTree>
@@ -14937,21 +15068,21 @@
       </p:pic>
       <p:grpSp>
         <p:nvGrpSpPr>
-          <p:cNvPr id="5" name="그룹 4"/>
+          <p:cNvPr id="9" name="그룹 8"/>
           <p:cNvGrpSpPr/>
           <p:nvPr/>
         </p:nvGrpSpPr>
         <p:grpSpPr>
           <a:xfrm>
-            <a:off x="3332344" y="4912390"/>
-            <a:ext cx="6124694" cy="1793209"/>
-            <a:chOff x="537387" y="2976499"/>
-            <a:chExt cx="11117226" cy="3416443"/>
+            <a:off x="3924709" y="5078321"/>
+            <a:ext cx="3612914" cy="1190674"/>
+            <a:chOff x="2853789" y="4649953"/>
+            <a:chExt cx="5877745" cy="1943497"/>
           </a:xfrm>
         </p:grpSpPr>
         <p:pic>
           <p:nvPicPr>
-            <p:cNvPr id="6" name="그림 5"/>
+            <p:cNvPr id="3" name="그림 2"/>
             <p:cNvPicPr>
               <a:picLocks noChangeAspect="1"/>
             </p:cNvPicPr>
@@ -14965,8 +15096,8 @@
           </p:blipFill>
           <p:spPr>
             <a:xfrm>
-              <a:off x="537387" y="2976499"/>
-              <a:ext cx="11117226" cy="905001"/>
+              <a:off x="2853789" y="5555080"/>
+              <a:ext cx="1752845" cy="1038370"/>
             </a:xfrm>
             <a:prstGeom prst="rect">
               <a:avLst/>
@@ -14975,7 +15106,7 @@
         </p:pic>
         <p:pic>
           <p:nvPicPr>
-            <p:cNvPr id="7" name="그림 6"/>
+            <p:cNvPr id="8" name="그림 7"/>
             <p:cNvPicPr>
               <a:picLocks noChangeAspect="1"/>
             </p:cNvPicPr>
@@ -14989,8 +15120,8 @@
           </p:blipFill>
           <p:spPr>
             <a:xfrm>
-              <a:off x="537387" y="4335255"/>
-              <a:ext cx="7449590" cy="2057687"/>
+              <a:off x="2853789" y="4649953"/>
+              <a:ext cx="5877745" cy="704948"/>
             </a:xfrm>
             <a:prstGeom prst="rect">
               <a:avLst/>

</xml_diff>